<commit_message>
10 pamoka, papildomos skaidrės
</commit_message>
<xml_diff>
--- a/10_pamoka_12_13/10pamoka.pptx
+++ b/10_pamoka_12_13/10pamoka.pptx
@@ -6,25 +6,30 @@
   </p:sldMasterIdLst>
   <p:sldIdLst>
     <p:sldId id="272" r:id="rId2"/>
-    <p:sldId id="256" r:id="rId3"/>
-    <p:sldId id="257" r:id="rId4"/>
-    <p:sldId id="258" r:id="rId5"/>
-    <p:sldId id="259" r:id="rId6"/>
-    <p:sldId id="260" r:id="rId7"/>
-    <p:sldId id="264" r:id="rId8"/>
-    <p:sldId id="263" r:id="rId9"/>
-    <p:sldId id="261" r:id="rId10"/>
-    <p:sldId id="265" r:id="rId11"/>
-    <p:sldId id="266" r:id="rId12"/>
-    <p:sldId id="267" r:id="rId13"/>
-    <p:sldId id="269" r:id="rId14"/>
-    <p:sldId id="262" r:id="rId15"/>
-    <p:sldId id="271" r:id="rId16"/>
-    <p:sldId id="268" r:id="rId17"/>
-    <p:sldId id="270" r:id="rId18"/>
-    <p:sldId id="273" r:id="rId19"/>
-    <p:sldId id="274" r:id="rId20"/>
-    <p:sldId id="275" r:id="rId21"/>
+    <p:sldId id="276" r:id="rId3"/>
+    <p:sldId id="277" r:id="rId4"/>
+    <p:sldId id="278" r:id="rId5"/>
+    <p:sldId id="279" r:id="rId6"/>
+    <p:sldId id="256" r:id="rId7"/>
+    <p:sldId id="257" r:id="rId8"/>
+    <p:sldId id="258" r:id="rId9"/>
+    <p:sldId id="259" r:id="rId10"/>
+    <p:sldId id="260" r:id="rId11"/>
+    <p:sldId id="264" r:id="rId12"/>
+    <p:sldId id="263" r:id="rId13"/>
+    <p:sldId id="261" r:id="rId14"/>
+    <p:sldId id="265" r:id="rId15"/>
+    <p:sldId id="266" r:id="rId16"/>
+    <p:sldId id="267" r:id="rId17"/>
+    <p:sldId id="269" r:id="rId18"/>
+    <p:sldId id="262" r:id="rId19"/>
+    <p:sldId id="280" r:id="rId20"/>
+    <p:sldId id="271" r:id="rId21"/>
+    <p:sldId id="268" r:id="rId22"/>
+    <p:sldId id="270" r:id="rId23"/>
+    <p:sldId id="273" r:id="rId24"/>
+    <p:sldId id="274" r:id="rId25"/>
+    <p:sldId id="275" r:id="rId26"/>
   </p:sldIdLst>
   <p:sldSz cx="12192000" cy="6858000"/>
   <p:notesSz cx="6858000" cy="9144000"/>
@@ -123,6 +128,11 @@
       </a:defRPr>
     </a:lvl9pPr>
   </p:defaultTextStyle>
+  <p:extLst>
+    <p:ext uri="{EFAFB233-063F-42B5-8137-9DF3F51BA10A}">
+      <p15:sldGuideLst xmlns:p15="http://schemas.microsoft.com/office/powerpoint/2012/main"/>
+    </p:ext>
+  </p:extLst>
 </p:presentation>
 </file>
 
@@ -3082,6 +3092,535 @@
           <a:p>
             <a:r>
               <a:rPr lang="lt-LT" dirty="0" smtClean="0"/>
+              <a:t>List&lt;kažkos&gt; kintamojo tipas</a:t>
+            </a:r>
+            <a:endParaRPr lang="en-US" dirty="0"/>
+          </a:p>
+        </p:txBody>
+      </p:sp>
+      <p:pic>
+        <p:nvPicPr>
+          <p:cNvPr id="5126" name="Picture 6" descr="http://i.imgur.com/hnKb7A1.png"/>
+          <p:cNvPicPr>
+            <a:picLocks noChangeAspect="1" noChangeArrowheads="1"/>
+          </p:cNvPicPr>
+          <p:nvPr/>
+        </p:nvPicPr>
+        <p:blipFill>
+          <a:blip r:embed="rId2">
+            <a:extLst>
+              <a:ext uri="{28A0092B-C50C-407E-A947-70E740481C1C}">
+                <a14:useLocalDpi xmlns:a14="http://schemas.microsoft.com/office/drawing/2010/main" val="0"/>
+              </a:ext>
+            </a:extLst>
+          </a:blip>
+          <a:srcRect/>
+          <a:stretch>
+            <a:fillRect/>
+          </a:stretch>
+        </p:blipFill>
+        <p:spPr bwMode="auto">
+          <a:xfrm>
+            <a:off x="921929" y="1690688"/>
+            <a:ext cx="9737362" cy="4555890"/>
+          </a:xfrm>
+          <a:prstGeom prst="rect">
+            <a:avLst/>
+          </a:prstGeom>
+          <a:noFill/>
+          <a:extLst>
+            <a:ext uri="{909E8E84-426E-40DD-AFC4-6F175D3DCCD1}">
+              <a14:hiddenFill xmlns:a14="http://schemas.microsoft.com/office/drawing/2010/main">
+                <a:solidFill>
+                  <a:srgbClr val="FFFFFF"/>
+                </a:solidFill>
+              </a14:hiddenFill>
+            </a:ext>
+          </a:extLst>
+        </p:spPr>
+      </p:pic>
+    </p:spTree>
+    <p:extLst>
+      <p:ext uri="{BB962C8B-B14F-4D97-AF65-F5344CB8AC3E}">
+        <p14:creationId xmlns:p14="http://schemas.microsoft.com/office/powerpoint/2010/main" val="4146917460"/>
+      </p:ext>
+    </p:extLst>
+  </p:cSld>
+  <p:clrMapOvr>
+    <a:masterClrMapping/>
+  </p:clrMapOvr>
+</p:sld>
+</file>
+
+<file path=ppt/slides/slide11.xml><?xml version="1.0" encoding="utf-8"?>
+<p:sld xmlns:a="http://schemas.openxmlformats.org/drawingml/2006/main" xmlns:r="http://schemas.openxmlformats.org/officeDocument/2006/relationships" xmlns:p="http://schemas.openxmlformats.org/presentationml/2006/main">
+  <p:cSld>
+    <p:spTree>
+      <p:nvGrpSpPr>
+        <p:cNvPr id="1" name=""/>
+        <p:cNvGrpSpPr/>
+        <p:nvPr/>
+      </p:nvGrpSpPr>
+      <p:grpSpPr>
+        <a:xfrm>
+          <a:off x="0" y="0"/>
+          <a:ext cx="0" cy="0"/>
+          <a:chOff x="0" y="0"/>
+          <a:chExt cx="0" cy="0"/>
+        </a:xfrm>
+      </p:grpSpPr>
+      <p:sp>
+        <p:nvSpPr>
+          <p:cNvPr id="2" name="Title 1"/>
+          <p:cNvSpPr>
+            <a:spLocks noGrp="1"/>
+          </p:cNvSpPr>
+          <p:nvPr>
+            <p:ph type="title"/>
+          </p:nvPr>
+        </p:nvSpPr>
+        <p:spPr/>
+        <p:txBody>
+          <a:bodyPr/>
+          <a:lstStyle/>
+          <a:p>
+            <a:r>
+              <a:rPr lang="en-US" dirty="0" err="1" smtClean="0"/>
+              <a:t>Kaip</a:t>
+            </a:r>
+            <a:r>
+              <a:rPr lang="en-US" dirty="0" smtClean="0"/>
+              <a:t> </a:t>
+            </a:r>
+            <a:r>
+              <a:rPr lang="en-US" dirty="0" err="1" smtClean="0"/>
+              <a:t>patikrinti</a:t>
+            </a:r>
+            <a:r>
+              <a:rPr lang="en-US" dirty="0" smtClean="0"/>
+              <a:t>, </a:t>
+            </a:r>
+            <a:r>
+              <a:rPr lang="en-US" dirty="0" err="1" smtClean="0"/>
+              <a:t>ar</a:t>
+            </a:r>
+            <a:r>
+              <a:rPr lang="en-US" dirty="0" smtClean="0"/>
+              <a:t> </a:t>
+            </a:r>
+            <a:r>
+              <a:rPr lang="en-US" dirty="0" err="1" smtClean="0"/>
+              <a:t>List’as</a:t>
+            </a:r>
+            <a:r>
+              <a:rPr lang="en-US" dirty="0" smtClean="0"/>
+              <a:t> </a:t>
+            </a:r>
+            <a:r>
+              <a:rPr lang="en-US" dirty="0" err="1" smtClean="0"/>
+              <a:t>turi</a:t>
+            </a:r>
+            <a:r>
+              <a:rPr lang="lt-LT" dirty="0"/>
+              <a:t> </a:t>
+            </a:r>
+            <a:r>
+              <a:rPr lang="lt-LT" dirty="0" smtClean="0"/>
+              <a:t>mano </a:t>
+            </a:r>
+            <a:r>
+              <a:rPr lang="en-US" dirty="0" smtClean="0"/>
+              <a:t>element</a:t>
+            </a:r>
+            <a:r>
+              <a:rPr lang="lt-LT" dirty="0" smtClean="0"/>
+              <a:t>ą?</a:t>
+            </a:r>
+            <a:endParaRPr lang="en-US" dirty="0"/>
+          </a:p>
+        </p:txBody>
+      </p:sp>
+      <p:pic>
+        <p:nvPicPr>
+          <p:cNvPr id="8194" name="Picture 2" descr="http://i.imgur.com/HJTaw1z.png"/>
+          <p:cNvPicPr>
+            <a:picLocks noChangeAspect="1" noChangeArrowheads="1"/>
+          </p:cNvPicPr>
+          <p:nvPr/>
+        </p:nvPicPr>
+        <p:blipFill>
+          <a:blip r:embed="rId2">
+            <a:extLst>
+              <a:ext uri="{28A0092B-C50C-407E-A947-70E740481C1C}">
+                <a14:useLocalDpi xmlns:a14="http://schemas.microsoft.com/office/drawing/2010/main" val="0"/>
+              </a:ext>
+            </a:extLst>
+          </a:blip>
+          <a:srcRect/>
+          <a:stretch>
+            <a:fillRect/>
+          </a:stretch>
+        </p:blipFill>
+        <p:spPr bwMode="auto">
+          <a:xfrm>
+            <a:off x="838200" y="2340427"/>
+            <a:ext cx="9620250" cy="3657600"/>
+          </a:xfrm>
+          <a:prstGeom prst="rect">
+            <a:avLst/>
+          </a:prstGeom>
+          <a:noFill/>
+          <a:extLst>
+            <a:ext uri="{909E8E84-426E-40DD-AFC4-6F175D3DCCD1}">
+              <a14:hiddenFill xmlns:a14="http://schemas.microsoft.com/office/drawing/2010/main">
+                <a:solidFill>
+                  <a:srgbClr val="FFFFFF"/>
+                </a:solidFill>
+              </a14:hiddenFill>
+            </a:ext>
+          </a:extLst>
+        </p:spPr>
+      </p:pic>
+      <p:sp>
+        <p:nvSpPr>
+          <p:cNvPr id="4" name="TextBox 3"/>
+          <p:cNvSpPr txBox="1"/>
+          <p:nvPr/>
+        </p:nvSpPr>
+        <p:spPr>
+          <a:xfrm>
+            <a:off x="957943" y="1461559"/>
+            <a:ext cx="8064137" cy="369332"/>
+          </a:xfrm>
+          <a:prstGeom prst="rect">
+            <a:avLst/>
+          </a:prstGeom>
+          <a:noFill/>
+        </p:spPr>
+        <p:txBody>
+          <a:bodyPr wrap="square" rtlCol="0">
+            <a:spAutoFit/>
+          </a:bodyPr>
+          <a:lstStyle/>
+          <a:p>
+            <a:r>
+              <a:rPr lang="lt-LT" dirty="0" smtClean="0"/>
+              <a:t>Daugiau: https://www.dotnetperls.com/list</a:t>
+            </a:r>
+            <a:endParaRPr lang="en-US" dirty="0"/>
+          </a:p>
+        </p:txBody>
+      </p:sp>
+    </p:spTree>
+    <p:extLst>
+      <p:ext uri="{BB962C8B-B14F-4D97-AF65-F5344CB8AC3E}">
+        <p14:creationId xmlns:p14="http://schemas.microsoft.com/office/powerpoint/2010/main" val="2208338670"/>
+      </p:ext>
+    </p:extLst>
+  </p:cSld>
+  <p:clrMapOvr>
+    <a:masterClrMapping/>
+  </p:clrMapOvr>
+</p:sld>
+</file>
+
+<file path=ppt/slides/slide12.xml><?xml version="1.0" encoding="utf-8"?>
+<p:sld xmlns:a="http://schemas.openxmlformats.org/drawingml/2006/main" xmlns:r="http://schemas.openxmlformats.org/officeDocument/2006/relationships" xmlns:p="http://schemas.openxmlformats.org/presentationml/2006/main">
+  <p:cSld>
+    <p:spTree>
+      <p:nvGrpSpPr>
+        <p:cNvPr id="1" name=""/>
+        <p:cNvGrpSpPr/>
+        <p:nvPr/>
+      </p:nvGrpSpPr>
+      <p:grpSpPr>
+        <a:xfrm>
+          <a:off x="0" y="0"/>
+          <a:ext cx="0" cy="0"/>
+          <a:chOff x="0" y="0"/>
+          <a:chExt cx="0" cy="0"/>
+        </a:xfrm>
+      </p:grpSpPr>
+      <p:sp>
+        <p:nvSpPr>
+          <p:cNvPr id="2" name="Title 1"/>
+          <p:cNvSpPr>
+            <a:spLocks noGrp="1"/>
+          </p:cNvSpPr>
+          <p:nvPr>
+            <p:ph type="title"/>
+          </p:nvPr>
+        </p:nvSpPr>
+        <p:spPr/>
+        <p:txBody>
+          <a:bodyPr/>
+          <a:lstStyle/>
+          <a:p>
+            <a:r>
+              <a:rPr lang="lt-LT" dirty="0" smtClean="0"/>
+              <a:t>Kaip kaupti priešo judesius?</a:t>
+            </a:r>
+            <a:endParaRPr lang="en-US" dirty="0"/>
+          </a:p>
+        </p:txBody>
+      </p:sp>
+      <p:pic>
+        <p:nvPicPr>
+          <p:cNvPr id="7170" name="Picture 2" descr="http://i.imgur.com/xM05DPV.png"/>
+          <p:cNvPicPr>
+            <a:picLocks noChangeAspect="1" noChangeArrowheads="1"/>
+          </p:cNvPicPr>
+          <p:nvPr/>
+        </p:nvPicPr>
+        <p:blipFill>
+          <a:blip r:embed="rId2">
+            <a:extLst>
+              <a:ext uri="{28A0092B-C50C-407E-A947-70E740481C1C}">
+                <a14:useLocalDpi xmlns:a14="http://schemas.microsoft.com/office/drawing/2010/main" val="0"/>
+              </a:ext>
+            </a:extLst>
+          </a:blip>
+          <a:srcRect/>
+          <a:stretch>
+            <a:fillRect/>
+          </a:stretch>
+        </p:blipFill>
+        <p:spPr bwMode="auto">
+          <a:xfrm>
+            <a:off x="536120" y="1690688"/>
+            <a:ext cx="10913163" cy="2567803"/>
+          </a:xfrm>
+          <a:prstGeom prst="rect">
+            <a:avLst/>
+          </a:prstGeom>
+          <a:noFill/>
+          <a:extLst>
+            <a:ext uri="{909E8E84-426E-40DD-AFC4-6F175D3DCCD1}">
+              <a14:hiddenFill xmlns:a14="http://schemas.microsoft.com/office/drawing/2010/main">
+                <a:solidFill>
+                  <a:srgbClr val="FFFFFF"/>
+                </a:solidFill>
+              </a14:hiddenFill>
+            </a:ext>
+          </a:extLst>
+        </p:spPr>
+      </p:pic>
+      <p:sp>
+        <p:nvSpPr>
+          <p:cNvPr id="5" name="TextBox 4"/>
+          <p:cNvSpPr txBox="1"/>
+          <p:nvPr/>
+        </p:nvSpPr>
+        <p:spPr>
+          <a:xfrm>
+            <a:off x="627017" y="4667794"/>
+            <a:ext cx="10955383" cy="646331"/>
+          </a:xfrm>
+          <a:prstGeom prst="rect">
+            <a:avLst/>
+          </a:prstGeom>
+          <a:noFill/>
+        </p:spPr>
+        <p:txBody>
+          <a:bodyPr wrap="square" rtlCol="0">
+            <a:spAutoFit/>
+          </a:bodyPr>
+          <a:lstStyle/>
+          <a:p>
+            <a:r>
+              <a:rPr lang="lt-LT" sz="3600" dirty="0" smtClean="0"/>
+              <a:t>Ar veiks </a:t>
+            </a:r>
+            <a:r>
+              <a:rPr lang="lt-LT" sz="3600" dirty="0" smtClean="0">
+                <a:sym typeface="Wingdings" panose="05000000000000000000" pitchFamily="2" charset="2"/>
+              </a:rPr>
+              <a:t> ? </a:t>
+            </a:r>
+            <a:endParaRPr lang="en-US" sz="3600" dirty="0"/>
+          </a:p>
+        </p:txBody>
+      </p:sp>
+    </p:spTree>
+    <p:extLst>
+      <p:ext uri="{BB962C8B-B14F-4D97-AF65-F5344CB8AC3E}">
+        <p14:creationId xmlns:p14="http://schemas.microsoft.com/office/powerpoint/2010/main" val="914770925"/>
+      </p:ext>
+    </p:extLst>
+  </p:cSld>
+  <p:clrMapOvr>
+    <a:masterClrMapping/>
+  </p:clrMapOvr>
+</p:sld>
+</file>
+
+<file path=ppt/slides/slide13.xml><?xml version="1.0" encoding="utf-8"?>
+<p:sld xmlns:a="http://schemas.openxmlformats.org/drawingml/2006/main" xmlns:r="http://schemas.openxmlformats.org/officeDocument/2006/relationships" xmlns:p="http://schemas.openxmlformats.org/presentationml/2006/main">
+  <p:cSld>
+    <p:spTree>
+      <p:nvGrpSpPr>
+        <p:cNvPr id="1" name=""/>
+        <p:cNvGrpSpPr/>
+        <p:nvPr/>
+      </p:nvGrpSpPr>
+      <p:grpSpPr>
+        <a:xfrm>
+          <a:off x="0" y="0"/>
+          <a:ext cx="0" cy="0"/>
+          <a:chOff x="0" y="0"/>
+          <a:chExt cx="0" cy="0"/>
+        </a:xfrm>
+      </p:grpSpPr>
+      <p:sp>
+        <p:nvSpPr>
+          <p:cNvPr id="7" name="Title 6"/>
+          <p:cNvSpPr>
+            <a:spLocks noGrp="1"/>
+          </p:cNvSpPr>
+          <p:nvPr>
+            <p:ph type="title"/>
+          </p:nvPr>
+        </p:nvSpPr>
+        <p:spPr>
+          <a:xfrm>
+            <a:off x="838200" y="365125"/>
+            <a:ext cx="10515600" cy="3013801"/>
+          </a:xfrm>
+        </p:spPr>
+        <p:txBody>
+          <a:bodyPr/>
+          <a:lstStyle/>
+          <a:p>
+            <a:r>
+              <a:rPr lang="en-US" dirty="0" err="1" smtClean="0"/>
+              <a:t>Pataisytas</a:t>
+            </a:r>
+            <a:r>
+              <a:rPr lang="en-US" dirty="0" smtClean="0"/>
+              <a:t> </a:t>
+            </a:r>
+            <a:r>
+              <a:rPr lang="en-US" dirty="0" err="1" smtClean="0"/>
+              <a:t>pavyzdys</a:t>
+            </a:r>
+            <a:r>
+              <a:rPr lang="en-US" dirty="0" smtClean="0"/>
+              <a:t> – </a:t>
+            </a:r>
+            <a:r>
+              <a:rPr lang="en-US" dirty="0" err="1" smtClean="0"/>
+              <a:t>opponentsMoves</a:t>
+            </a:r>
+            <a:r>
+              <a:rPr lang="en-US" dirty="0" smtClean="0"/>
+              <a:t> </a:t>
+            </a:r>
+            <a:r>
+              <a:rPr lang="en-US" dirty="0" err="1" smtClean="0"/>
+              <a:t>negali</a:t>
+            </a:r>
+            <a:r>
+              <a:rPr lang="en-US" dirty="0" smtClean="0"/>
+              <a:t> b</a:t>
+            </a:r>
+            <a:r>
+              <a:rPr lang="lt-LT" dirty="0" smtClean="0"/>
+              <a:t>ūti metodo viduje, nes kas kartą kviečiant metodą būtų sukuriamas iš naujo.</a:t>
+            </a:r>
+            <a:endParaRPr lang="en-US" dirty="0"/>
+          </a:p>
+        </p:txBody>
+      </p:sp>
+      <p:pic>
+        <p:nvPicPr>
+          <p:cNvPr id="6148" name="Picture 4" descr="http://i.imgur.com/RyQ0W2r.png"/>
+          <p:cNvPicPr>
+            <a:picLocks noGrp="1" noChangeAspect="1" noChangeArrowheads="1"/>
+          </p:cNvPicPr>
+          <p:nvPr>
+            <p:ph idx="1"/>
+          </p:nvPr>
+        </p:nvPicPr>
+        <p:blipFill>
+          <a:blip r:embed="rId2">
+            <a:extLst>
+              <a:ext uri="{28A0092B-C50C-407E-A947-70E740481C1C}">
+                <a14:useLocalDpi xmlns:a14="http://schemas.microsoft.com/office/drawing/2010/main" val="0"/>
+              </a:ext>
+            </a:extLst>
+          </a:blip>
+          <a:srcRect/>
+          <a:stretch>
+            <a:fillRect/>
+          </a:stretch>
+        </p:blipFill>
+        <p:spPr bwMode="auto">
+          <a:xfrm>
+            <a:off x="838200" y="3378926"/>
+            <a:ext cx="14210028" cy="2917370"/>
+          </a:xfrm>
+          <a:prstGeom prst="rect">
+            <a:avLst/>
+          </a:prstGeom>
+          <a:noFill/>
+          <a:extLst>
+            <a:ext uri="{909E8E84-426E-40DD-AFC4-6F175D3DCCD1}">
+              <a14:hiddenFill xmlns:a14="http://schemas.microsoft.com/office/drawing/2010/main">
+                <a:solidFill>
+                  <a:srgbClr val="FFFFFF"/>
+                </a:solidFill>
+              </a14:hiddenFill>
+            </a:ext>
+          </a:extLst>
+        </p:spPr>
+      </p:pic>
+    </p:spTree>
+    <p:extLst>
+      <p:ext uri="{BB962C8B-B14F-4D97-AF65-F5344CB8AC3E}">
+        <p14:creationId xmlns:p14="http://schemas.microsoft.com/office/powerpoint/2010/main" val="1411561169"/>
+      </p:ext>
+    </p:extLst>
+  </p:cSld>
+  <p:clrMapOvr>
+    <a:masterClrMapping/>
+  </p:clrMapOvr>
+</p:sld>
+</file>
+
+<file path=ppt/slides/slide14.xml><?xml version="1.0" encoding="utf-8"?>
+<p:sld xmlns:a="http://schemas.openxmlformats.org/drawingml/2006/main" xmlns:r="http://schemas.openxmlformats.org/officeDocument/2006/relationships" xmlns:p="http://schemas.openxmlformats.org/presentationml/2006/main">
+  <p:cSld>
+    <p:spTree>
+      <p:nvGrpSpPr>
+        <p:cNvPr id="1" name=""/>
+        <p:cNvGrpSpPr/>
+        <p:nvPr/>
+      </p:nvGrpSpPr>
+      <p:grpSpPr>
+        <a:xfrm>
+          <a:off x="0" y="0"/>
+          <a:ext cx="0" cy="0"/>
+          <a:chOff x="0" y="0"/>
+          <a:chExt cx="0" cy="0"/>
+        </a:xfrm>
+      </p:grpSpPr>
+      <p:sp>
+        <p:nvSpPr>
+          <p:cNvPr id="2" name="Title 1"/>
+          <p:cNvSpPr>
+            <a:spLocks noGrp="1"/>
+          </p:cNvSpPr>
+          <p:nvPr>
+            <p:ph type="title"/>
+          </p:nvPr>
+        </p:nvSpPr>
+        <p:spPr/>
+        <p:txBody>
+          <a:bodyPr/>
+          <a:lstStyle/>
+          <a:p>
+            <a:r>
+              <a:rPr lang="lt-LT" dirty="0" smtClean="0"/>
               <a:t>Kaip iteruoti per sukauptus priešininko judesius?</a:t>
             </a:r>
             <a:endParaRPr lang="en-US" dirty="0"/>
@@ -3201,7 +3740,7 @@
 </p:sld>
 </file>
 
-<file path=ppt/slides/slide11.xml><?xml version="1.0" encoding="utf-8"?>
+<file path=ppt/slides/slide15.xml><?xml version="1.0" encoding="utf-8"?>
 <p:sld xmlns:a="http://schemas.openxmlformats.org/drawingml/2006/main" xmlns:r="http://schemas.openxmlformats.org/officeDocument/2006/relationships" xmlns:p="http://schemas.openxmlformats.org/presentationml/2006/main">
   <p:cSld>
     <p:spTree>
@@ -3367,7 +3906,7 @@
 </p:sld>
 </file>
 
-<file path=ppt/slides/slide12.xml><?xml version="1.0" encoding="utf-8"?>
+<file path=ppt/slides/slide16.xml><?xml version="1.0" encoding="utf-8"?>
 <p:sld xmlns:a="http://schemas.openxmlformats.org/drawingml/2006/main" xmlns:r="http://schemas.openxmlformats.org/officeDocument/2006/relationships" xmlns:p="http://schemas.openxmlformats.org/presentationml/2006/main">
   <p:cSld>
     <p:spTree>
@@ -3424,7 +3963,7 @@
 </p:sld>
 </file>
 
-<file path=ppt/slides/slide13.xml><?xml version="1.0" encoding="utf-8"?>
+<file path=ppt/slides/slide17.xml><?xml version="1.0" encoding="utf-8"?>
 <p:sld xmlns:a="http://schemas.openxmlformats.org/drawingml/2006/main" xmlns:r="http://schemas.openxmlformats.org/officeDocument/2006/relationships" xmlns:p="http://schemas.openxmlformats.org/presentationml/2006/main">
   <p:cSld>
     <p:spTree>
@@ -3609,7 +4148,7 @@
 </p:sld>
 </file>
 
-<file path=ppt/slides/slide14.xml><?xml version="1.0" encoding="utf-8"?>
+<file path=ppt/slides/slide18.xml><?xml version="1.0" encoding="utf-8"?>
 <p:sld xmlns:a="http://schemas.openxmlformats.org/drawingml/2006/main" xmlns:r="http://schemas.openxmlformats.org/officeDocument/2006/relationships" xmlns:p="http://schemas.openxmlformats.org/presentationml/2006/main">
   <p:cSld>
     <p:spTree>
@@ -3705,7 +4244,7 @@
 </p:sld>
 </file>
 
-<file path=ppt/slides/slide15.xml><?xml version="1.0" encoding="utf-8"?>
+<file path=ppt/slides/slide19.xml><?xml version="1.0" encoding="utf-8"?>
 <p:sld xmlns:a="http://schemas.openxmlformats.org/drawingml/2006/main" xmlns:r="http://schemas.openxmlformats.org/officeDocument/2006/relationships" xmlns:p="http://schemas.openxmlformats.org/presentationml/2006/main">
   <p:cSld>
     <p:spTree>
@@ -3729,6 +4268,198 @@
             <a:spLocks noGrp="1"/>
           </p:cNvSpPr>
           <p:nvPr>
+            <p:ph type="title"/>
+          </p:nvPr>
+        </p:nvSpPr>
+        <p:spPr/>
+        <p:txBody>
+          <a:bodyPr/>
+          <a:lstStyle/>
+          <a:p>
+            <a:r>
+              <a:rPr lang="lt-LT" dirty="0" smtClean="0"/>
+              <a:t>Užduotis</a:t>
+            </a:r>
+            <a:endParaRPr lang="en-US" dirty="0"/>
+          </a:p>
+        </p:txBody>
+      </p:sp>
+      <p:sp>
+        <p:nvSpPr>
+          <p:cNvPr id="3" name="Content Placeholder 2"/>
+          <p:cNvSpPr>
+            <a:spLocks noGrp="1"/>
+          </p:cNvSpPr>
+          <p:nvPr>
+            <p:ph idx="1"/>
+          </p:nvPr>
+        </p:nvSpPr>
+        <p:spPr/>
+        <p:txBody>
+          <a:bodyPr/>
+          <a:lstStyle/>
+          <a:p>
+            <a:r>
+              <a:rPr lang="lt-LT" dirty="0" smtClean="0"/>
+              <a:t>Patobulinti savo botą</a:t>
+            </a:r>
+          </a:p>
+          <a:p>
+            <a:pPr lvl="1"/>
+            <a:r>
+              <a:rPr lang="lt-LT" dirty="0" smtClean="0"/>
+              <a:t>Naujas botas treniruotėms</a:t>
+            </a:r>
+          </a:p>
+          <a:p>
+            <a:pPr lvl="2"/>
+            <a:r>
+              <a:rPr lang="lt-LT" dirty="0" smtClean="0"/>
+              <a:t>Reikia atsinaujinti repozitoriją</a:t>
+            </a:r>
+          </a:p>
+          <a:p>
+            <a:r>
+              <a:rPr lang="lt-LT" dirty="0" smtClean="0"/>
+              <a:t>Užsiregistruoti į turnyrą</a:t>
+            </a:r>
+            <a:endParaRPr lang="en-US" dirty="0"/>
+          </a:p>
+        </p:txBody>
+      </p:sp>
+    </p:spTree>
+    <p:extLst>
+      <p:ext uri="{BB962C8B-B14F-4D97-AF65-F5344CB8AC3E}">
+        <p14:creationId xmlns:p14="http://schemas.microsoft.com/office/powerpoint/2010/main" val="1530441852"/>
+      </p:ext>
+    </p:extLst>
+  </p:cSld>
+  <p:clrMapOvr>
+    <a:masterClrMapping/>
+  </p:clrMapOvr>
+</p:sld>
+</file>
+
+<file path=ppt/slides/slide2.xml><?xml version="1.0" encoding="utf-8"?>
+<p:sld xmlns:a="http://schemas.openxmlformats.org/drawingml/2006/main" xmlns:r="http://schemas.openxmlformats.org/officeDocument/2006/relationships" xmlns:p="http://schemas.openxmlformats.org/presentationml/2006/main">
+  <p:cSld>
+    <p:spTree>
+      <p:nvGrpSpPr>
+        <p:cNvPr id="1" name=""/>
+        <p:cNvGrpSpPr/>
+        <p:nvPr/>
+      </p:nvGrpSpPr>
+      <p:grpSpPr>
+        <a:xfrm>
+          <a:off x="0" y="0"/>
+          <a:ext cx="0" cy="0"/>
+          <a:chOff x="0" y="0"/>
+          <a:chExt cx="0" cy="0"/>
+        </a:xfrm>
+      </p:grpSpPr>
+      <p:sp>
+        <p:nvSpPr>
+          <p:cNvPr id="2" name="Title 1"/>
+          <p:cNvSpPr>
+            <a:spLocks noGrp="1"/>
+          </p:cNvSpPr>
+          <p:nvPr>
+            <p:ph type="title"/>
+          </p:nvPr>
+        </p:nvSpPr>
+        <p:spPr/>
+        <p:txBody>
+          <a:bodyPr/>
+          <a:lstStyle/>
+          <a:p>
+            <a:r>
+              <a:rPr lang="en-US" dirty="0" err="1"/>
+              <a:t>SimpleBot</a:t>
+            </a:r>
+            <a:endParaRPr lang="en-US" dirty="0"/>
+          </a:p>
+        </p:txBody>
+      </p:sp>
+      <p:pic>
+        <p:nvPicPr>
+          <p:cNvPr id="1027" name="Picture 3" descr="http://i.imgur.com/74ptUZc.png"/>
+          <p:cNvPicPr>
+            <a:picLocks noGrp="1" noChangeAspect="1" noChangeArrowheads="1"/>
+          </p:cNvPicPr>
+          <p:nvPr>
+            <p:ph idx="1"/>
+          </p:nvPr>
+        </p:nvPicPr>
+        <p:blipFill>
+          <a:blip r:embed="rId2">
+            <a:extLst>
+              <a:ext uri="{28A0092B-C50C-407E-A947-70E740481C1C}">
+                <a14:useLocalDpi xmlns:a14="http://schemas.microsoft.com/office/drawing/2010/main" val="0"/>
+              </a:ext>
+            </a:extLst>
+          </a:blip>
+          <a:srcRect/>
+          <a:stretch>
+            <a:fillRect/>
+          </a:stretch>
+        </p:blipFill>
+        <p:spPr bwMode="auto">
+          <a:xfrm>
+            <a:off x="724655" y="2073865"/>
+            <a:ext cx="10897038" cy="2498135"/>
+          </a:xfrm>
+          <a:prstGeom prst="rect">
+            <a:avLst/>
+          </a:prstGeom>
+          <a:noFill/>
+          <a:extLst>
+            <a:ext uri="{909E8E84-426E-40DD-AFC4-6F175D3DCCD1}">
+              <a14:hiddenFill xmlns:a14="http://schemas.microsoft.com/office/drawing/2010/main">
+                <a:solidFill>
+                  <a:srgbClr val="FFFFFF"/>
+                </a:solidFill>
+              </a14:hiddenFill>
+            </a:ext>
+          </a:extLst>
+        </p:spPr>
+      </p:pic>
+    </p:spTree>
+    <p:extLst>
+      <p:ext uri="{BB962C8B-B14F-4D97-AF65-F5344CB8AC3E}">
+        <p14:creationId xmlns:p14="http://schemas.microsoft.com/office/powerpoint/2010/main" val="4228222873"/>
+      </p:ext>
+    </p:extLst>
+  </p:cSld>
+  <p:clrMapOvr>
+    <a:masterClrMapping/>
+  </p:clrMapOvr>
+</p:sld>
+</file>
+
+<file path=ppt/slides/slide20.xml><?xml version="1.0" encoding="utf-8"?>
+<p:sld xmlns:a="http://schemas.openxmlformats.org/drawingml/2006/main" xmlns:r="http://schemas.openxmlformats.org/officeDocument/2006/relationships" xmlns:p="http://schemas.openxmlformats.org/presentationml/2006/main">
+  <p:cSld>
+    <p:spTree>
+      <p:nvGrpSpPr>
+        <p:cNvPr id="1" name=""/>
+        <p:cNvGrpSpPr/>
+        <p:nvPr/>
+      </p:nvGrpSpPr>
+      <p:grpSpPr>
+        <a:xfrm>
+          <a:off x="0" y="0"/>
+          <a:ext cx="0" cy="0"/>
+          <a:chOff x="0" y="0"/>
+          <a:chExt cx="0" cy="0"/>
+        </a:xfrm>
+      </p:grpSpPr>
+      <p:sp>
+        <p:nvSpPr>
+          <p:cNvPr id="2" name="Title 1"/>
+          <p:cNvSpPr>
+            <a:spLocks noGrp="1"/>
+          </p:cNvSpPr>
+          <p:nvPr>
             <p:ph type="ctrTitle"/>
           </p:nvPr>
         </p:nvSpPr>
@@ -3777,7 +4508,7 @@
 </p:sld>
 </file>
 
-<file path=ppt/slides/slide16.xml><?xml version="1.0" encoding="utf-8"?>
+<file path=ppt/slides/slide21.xml><?xml version="1.0" encoding="utf-8"?>
 <p:sld xmlns:a="http://schemas.openxmlformats.org/drawingml/2006/main" xmlns:r="http://schemas.openxmlformats.org/officeDocument/2006/relationships" xmlns:p="http://schemas.openxmlformats.org/presentationml/2006/main">
   <p:cSld>
     <p:spTree>
@@ -3877,7 +4608,7 @@
 </p:sld>
 </file>
 
-<file path=ppt/slides/slide17.xml><?xml version="1.0" encoding="utf-8"?>
+<file path=ppt/slides/slide22.xml><?xml version="1.0" encoding="utf-8"?>
 <p:sld xmlns:a="http://schemas.openxmlformats.org/drawingml/2006/main" xmlns:r="http://schemas.openxmlformats.org/officeDocument/2006/relationships" xmlns:p="http://schemas.openxmlformats.org/presentationml/2006/main">
   <p:cSld>
     <p:spTree>
@@ -3973,7 +4704,7 @@
 </p:sld>
 </file>
 
-<file path=ppt/slides/slide18.xml><?xml version="1.0" encoding="utf-8"?>
+<file path=ppt/slides/slide23.xml><?xml version="1.0" encoding="utf-8"?>
 <p:sld xmlns:a="http://schemas.openxmlformats.org/drawingml/2006/main" xmlns:r="http://schemas.openxmlformats.org/officeDocument/2006/relationships" xmlns:p="http://schemas.openxmlformats.org/presentationml/2006/main">
   <p:cSld>
     <p:spTree>
@@ -4069,7 +4800,7 @@
 </p:sld>
 </file>
 
-<file path=ppt/slides/slide19.xml><?xml version="1.0" encoding="utf-8"?>
+<file path=ppt/slides/slide24.xml><?xml version="1.0" encoding="utf-8"?>
 <p:sld xmlns:a="http://schemas.openxmlformats.org/drawingml/2006/main" xmlns:r="http://schemas.openxmlformats.org/officeDocument/2006/relationships" xmlns:p="http://schemas.openxmlformats.org/presentationml/2006/main">
   <p:cSld>
     <p:spTree>
@@ -4165,7 +4896,489 @@
 </p:sld>
 </file>
 
-<file path=ppt/slides/slide2.xml><?xml version="1.0" encoding="utf-8"?>
+<file path=ppt/slides/slide25.xml><?xml version="1.0" encoding="utf-8"?>
+<p:sld xmlns:a="http://schemas.openxmlformats.org/drawingml/2006/main" xmlns:r="http://schemas.openxmlformats.org/officeDocument/2006/relationships" xmlns:p="http://schemas.openxmlformats.org/presentationml/2006/main">
+  <p:cSld>
+    <p:spTree>
+      <p:nvGrpSpPr>
+        <p:cNvPr id="1" name=""/>
+        <p:cNvGrpSpPr/>
+        <p:nvPr/>
+      </p:nvGrpSpPr>
+      <p:grpSpPr>
+        <a:xfrm>
+          <a:off x="0" y="0"/>
+          <a:ext cx="0" cy="0"/>
+          <a:chOff x="0" y="0"/>
+          <a:chExt cx="0" cy="0"/>
+        </a:xfrm>
+      </p:grpSpPr>
+      <p:sp>
+        <p:nvSpPr>
+          <p:cNvPr id="2" name="Title 1"/>
+          <p:cNvSpPr>
+            <a:spLocks noGrp="1"/>
+          </p:cNvSpPr>
+          <p:nvPr>
+            <p:ph type="title"/>
+          </p:nvPr>
+        </p:nvSpPr>
+        <p:spPr/>
+        <p:txBody>
+          <a:bodyPr>
+            <a:normAutofit fontScale="90000"/>
+          </a:bodyPr>
+          <a:lstStyle/>
+          <a:p>
+            <a:r>
+              <a:rPr lang="en-US" dirty="0" smtClean="0"/>
+              <a:t>https://channel9.msdn.com/Series/C-Sharp-Fundamentals-Development-for-Absolute-Beginners</a:t>
+            </a:r>
+            <a:endParaRPr lang="en-US" dirty="0"/>
+          </a:p>
+        </p:txBody>
+      </p:sp>
+      <p:pic>
+        <p:nvPicPr>
+          <p:cNvPr id="17412" name="Picture 4" descr="http://i.imgur.com/5d6njdH.png"/>
+          <p:cNvPicPr>
+            <a:picLocks noGrp="1" noChangeAspect="1" noChangeArrowheads="1"/>
+          </p:cNvPicPr>
+          <p:nvPr>
+            <p:ph idx="1"/>
+          </p:nvPr>
+        </p:nvPicPr>
+        <p:blipFill>
+          <a:blip r:embed="rId2">
+            <a:extLst>
+              <a:ext uri="{28A0092B-C50C-407E-A947-70E740481C1C}">
+                <a14:useLocalDpi xmlns:a14="http://schemas.microsoft.com/office/drawing/2010/main" val="0"/>
+              </a:ext>
+            </a:extLst>
+          </a:blip>
+          <a:srcRect/>
+          <a:stretch>
+            <a:fillRect/>
+          </a:stretch>
+        </p:blipFill>
+        <p:spPr bwMode="auto">
+          <a:xfrm>
+            <a:off x="1550534" y="2043113"/>
+            <a:ext cx="9090932" cy="4351337"/>
+          </a:xfrm>
+          <a:prstGeom prst="rect">
+            <a:avLst/>
+          </a:prstGeom>
+          <a:noFill/>
+          <a:extLst>
+            <a:ext uri="{909E8E84-426E-40DD-AFC4-6F175D3DCCD1}">
+              <a14:hiddenFill xmlns:a14="http://schemas.microsoft.com/office/drawing/2010/main">
+                <a:solidFill>
+                  <a:srgbClr val="FFFFFF"/>
+                </a:solidFill>
+              </a14:hiddenFill>
+            </a:ext>
+          </a:extLst>
+        </p:spPr>
+      </p:pic>
+    </p:spTree>
+    <p:extLst>
+      <p:ext uri="{BB962C8B-B14F-4D97-AF65-F5344CB8AC3E}">
+        <p14:creationId xmlns:p14="http://schemas.microsoft.com/office/powerpoint/2010/main" val="2782305416"/>
+      </p:ext>
+    </p:extLst>
+  </p:cSld>
+  <p:clrMapOvr>
+    <a:masterClrMapping/>
+  </p:clrMapOvr>
+</p:sld>
+</file>
+
+<file path=ppt/slides/slide3.xml><?xml version="1.0" encoding="utf-8"?>
+<p:sld xmlns:a="http://schemas.openxmlformats.org/drawingml/2006/main" xmlns:r="http://schemas.openxmlformats.org/officeDocument/2006/relationships" xmlns:p="http://schemas.openxmlformats.org/presentationml/2006/main">
+  <p:cSld>
+    <p:spTree>
+      <p:nvGrpSpPr>
+        <p:cNvPr id="1" name=""/>
+        <p:cNvGrpSpPr/>
+        <p:nvPr/>
+      </p:nvGrpSpPr>
+      <p:grpSpPr>
+        <a:xfrm>
+          <a:off x="0" y="0"/>
+          <a:ext cx="0" cy="0"/>
+          <a:chOff x="0" y="0"/>
+          <a:chExt cx="0" cy="0"/>
+        </a:xfrm>
+      </p:grpSpPr>
+      <p:sp>
+        <p:nvSpPr>
+          <p:cNvPr id="2" name="Title 1"/>
+          <p:cNvSpPr>
+            <a:spLocks noGrp="1"/>
+          </p:cNvSpPr>
+          <p:nvPr>
+            <p:ph type="title"/>
+          </p:nvPr>
+        </p:nvSpPr>
+        <p:spPr/>
+        <p:txBody>
+          <a:bodyPr/>
+          <a:lstStyle/>
+          <a:p>
+            <a:r>
+              <a:rPr lang="lt-LT" dirty="0" smtClean="0"/>
+              <a:t>MyFighter</a:t>
+            </a:r>
+            <a:endParaRPr lang="en-US" dirty="0"/>
+          </a:p>
+        </p:txBody>
+      </p:sp>
+      <p:pic>
+        <p:nvPicPr>
+          <p:cNvPr id="2050" name="Picture 2" descr="http://i.imgur.com/CiDqlDk.png"/>
+          <p:cNvPicPr>
+            <a:picLocks noGrp="1" noChangeAspect="1" noChangeArrowheads="1"/>
+          </p:cNvPicPr>
+          <p:nvPr>
+            <p:ph idx="1"/>
+          </p:nvPr>
+        </p:nvPicPr>
+        <p:blipFill>
+          <a:blip r:embed="rId2">
+            <a:extLst>
+              <a:ext uri="{28A0092B-C50C-407E-A947-70E740481C1C}">
+                <a14:useLocalDpi xmlns:a14="http://schemas.microsoft.com/office/drawing/2010/main" val="0"/>
+              </a:ext>
+            </a:extLst>
+          </a:blip>
+          <a:srcRect/>
+          <a:stretch>
+            <a:fillRect/>
+          </a:stretch>
+        </p:blipFill>
+        <p:spPr bwMode="auto">
+          <a:xfrm>
+            <a:off x="838200" y="1690688"/>
+            <a:ext cx="10845950" cy="2341381"/>
+          </a:xfrm>
+          <a:prstGeom prst="rect">
+            <a:avLst/>
+          </a:prstGeom>
+          <a:noFill/>
+          <a:extLst>
+            <a:ext uri="{909E8E84-426E-40DD-AFC4-6F175D3DCCD1}">
+              <a14:hiddenFill xmlns:a14="http://schemas.microsoft.com/office/drawing/2010/main">
+                <a:solidFill>
+                  <a:srgbClr val="FFFFFF"/>
+                </a:solidFill>
+              </a14:hiddenFill>
+            </a:ext>
+          </a:extLst>
+        </p:spPr>
+      </p:pic>
+      <p:sp>
+        <p:nvSpPr>
+          <p:cNvPr id="4" name="Rectangular Callout 3"/>
+          <p:cNvSpPr/>
+          <p:nvPr/>
+        </p:nvSpPr>
+        <p:spPr>
+          <a:xfrm rot="5400000">
+            <a:off x="8549640" y="1225733"/>
+            <a:ext cx="1894113" cy="4241074"/>
+          </a:xfrm>
+          <a:prstGeom prst="wedgeRectCallout">
+            <a:avLst/>
+          </a:prstGeom>
+        </p:spPr>
+        <p:style>
+          <a:lnRef idx="2">
+            <a:schemeClr val="accent1">
+              <a:shade val="50000"/>
+            </a:schemeClr>
+          </a:lnRef>
+          <a:fillRef idx="1">
+            <a:schemeClr val="accent1"/>
+          </a:fillRef>
+          <a:effectRef idx="0">
+            <a:schemeClr val="accent1"/>
+          </a:effectRef>
+          <a:fontRef idx="minor">
+            <a:schemeClr val="lt1"/>
+          </a:fontRef>
+        </p:style>
+        <p:txBody>
+          <a:bodyPr rtlCol="0" anchor="ctr"/>
+          <a:lstStyle/>
+          <a:p>
+            <a:pPr algn="ctr"/>
+            <a:endParaRPr lang="en-US"/>
+          </a:p>
+        </p:txBody>
+      </p:sp>
+      <p:sp>
+        <p:nvSpPr>
+          <p:cNvPr id="5" name="TextBox 4"/>
+          <p:cNvSpPr txBox="1"/>
+          <p:nvPr/>
+        </p:nvSpPr>
+        <p:spPr>
+          <a:xfrm>
+            <a:off x="7611291" y="2699657"/>
+            <a:ext cx="3742509" cy="923330"/>
+          </a:xfrm>
+          <a:prstGeom prst="rect">
+            <a:avLst/>
+          </a:prstGeom>
+          <a:noFill/>
+        </p:spPr>
+        <p:txBody>
+          <a:bodyPr wrap="square" rtlCol="0">
+            <a:spAutoFit/>
+          </a:bodyPr>
+          <a:lstStyle/>
+          <a:p>
+            <a:r>
+              <a:rPr lang="lt-LT" dirty="0">
+                <a:solidFill>
+                  <a:schemeClr val="bg1"/>
+                </a:solidFill>
+              </a:rPr>
+              <a:t>Strategija laimi prieš vieną botą, bet neturi visiškai jokių šansų prieš kitus botus</a:t>
+            </a:r>
+            <a:endParaRPr lang="en-US" dirty="0">
+              <a:solidFill>
+                <a:schemeClr val="bg1"/>
+              </a:solidFill>
+            </a:endParaRPr>
+          </a:p>
+        </p:txBody>
+      </p:sp>
+    </p:spTree>
+    <p:extLst>
+      <p:ext uri="{BB962C8B-B14F-4D97-AF65-F5344CB8AC3E}">
+        <p14:creationId xmlns:p14="http://schemas.microsoft.com/office/powerpoint/2010/main" val="4139843016"/>
+      </p:ext>
+    </p:extLst>
+  </p:cSld>
+  <p:clrMapOvr>
+    <a:masterClrMapping/>
+  </p:clrMapOvr>
+</p:sld>
+</file>
+
+<file path=ppt/slides/slide4.xml><?xml version="1.0" encoding="utf-8"?>
+<p:sld xmlns:a="http://schemas.openxmlformats.org/drawingml/2006/main" xmlns:r="http://schemas.openxmlformats.org/officeDocument/2006/relationships" xmlns:p="http://schemas.openxmlformats.org/presentationml/2006/main">
+  <p:cSld>
+    <p:spTree>
+      <p:nvGrpSpPr>
+        <p:cNvPr id="1" name=""/>
+        <p:cNvGrpSpPr/>
+        <p:nvPr/>
+      </p:nvGrpSpPr>
+      <p:grpSpPr>
+        <a:xfrm>
+          <a:off x="0" y="0"/>
+          <a:ext cx="0" cy="0"/>
+          <a:chOff x="0" y="0"/>
+          <a:chExt cx="0" cy="0"/>
+        </a:xfrm>
+      </p:grpSpPr>
+      <p:sp>
+        <p:nvSpPr>
+          <p:cNvPr id="2" name="Title 1"/>
+          <p:cNvSpPr>
+            <a:spLocks noGrp="1"/>
+          </p:cNvSpPr>
+          <p:nvPr>
+            <p:ph type="title"/>
+          </p:nvPr>
+        </p:nvSpPr>
+        <p:spPr/>
+        <p:txBody>
+          <a:bodyPr>
+            <a:normAutofit/>
+          </a:bodyPr>
+          <a:lstStyle/>
+          <a:p>
+            <a:r>
+              <a:rPr lang="lt-LT" dirty="0" smtClean="0"/>
+              <a:t>Ko mums reikia, norint laimėti prieš kitus robotus?</a:t>
+            </a:r>
+            <a:endParaRPr lang="en-US" dirty="0"/>
+          </a:p>
+        </p:txBody>
+      </p:sp>
+      <p:sp>
+        <p:nvSpPr>
+          <p:cNvPr id="3" name="Content Placeholder 2"/>
+          <p:cNvSpPr>
+            <a:spLocks noGrp="1"/>
+          </p:cNvSpPr>
+          <p:nvPr>
+            <p:ph idx="1"/>
+          </p:nvPr>
+        </p:nvSpPr>
+        <p:spPr/>
+        <p:txBody>
+          <a:bodyPr/>
+          <a:lstStyle/>
+          <a:p>
+            <a:r>
+              <a:rPr lang="lt-LT" dirty="0" smtClean="0"/>
+              <a:t>Fantazijos</a:t>
+            </a:r>
+          </a:p>
+          <a:p>
+            <a:r>
+              <a:rPr lang="lt-LT" dirty="0" smtClean="0"/>
+              <a:t>Sėkmės</a:t>
+            </a:r>
+          </a:p>
+          <a:p>
+            <a:r>
+              <a:rPr lang="lt-LT" dirty="0" smtClean="0"/>
+              <a:t>Geros strategijos</a:t>
+            </a:r>
+          </a:p>
+          <a:p>
+            <a:r>
+              <a:rPr lang="lt-LT" dirty="0" smtClean="0"/>
+              <a:t>„Kvailų“ priešininkų</a:t>
+            </a:r>
+          </a:p>
+          <a:p>
+            <a:r>
+              <a:rPr lang="lt-LT" dirty="0" smtClean="0"/>
+              <a:t>Išbandyti idėjas</a:t>
+            </a:r>
+          </a:p>
+          <a:p>
+            <a:r>
+              <a:rPr lang="lt-LT" dirty="0" smtClean="0"/>
+              <a:t>Adaptuotis</a:t>
+            </a:r>
+          </a:p>
+          <a:p>
+            <a:r>
+              <a:rPr lang="lt-LT" dirty="0" smtClean="0"/>
+              <a:t>???</a:t>
+            </a:r>
+            <a:endParaRPr lang="en-US" dirty="0"/>
+          </a:p>
+        </p:txBody>
+      </p:sp>
+    </p:spTree>
+    <p:extLst>
+      <p:ext uri="{BB962C8B-B14F-4D97-AF65-F5344CB8AC3E}">
+        <p14:creationId xmlns:p14="http://schemas.microsoft.com/office/powerpoint/2010/main" val="1557219587"/>
+      </p:ext>
+    </p:extLst>
+  </p:cSld>
+  <p:clrMapOvr>
+    <a:masterClrMapping/>
+  </p:clrMapOvr>
+</p:sld>
+</file>
+
+<file path=ppt/slides/slide5.xml><?xml version="1.0" encoding="utf-8"?>
+<p:sld xmlns:a="http://schemas.openxmlformats.org/drawingml/2006/main" xmlns:r="http://schemas.openxmlformats.org/officeDocument/2006/relationships" xmlns:p="http://schemas.openxmlformats.org/presentationml/2006/main">
+  <p:cSld>
+    <p:spTree>
+      <p:nvGrpSpPr>
+        <p:cNvPr id="1" name=""/>
+        <p:cNvGrpSpPr/>
+        <p:nvPr/>
+      </p:nvGrpSpPr>
+      <p:grpSpPr>
+        <a:xfrm>
+          <a:off x="0" y="0"/>
+          <a:ext cx="0" cy="0"/>
+          <a:chOff x="0" y="0"/>
+          <a:chExt cx="0" cy="0"/>
+        </a:xfrm>
+      </p:grpSpPr>
+      <p:sp>
+        <p:nvSpPr>
+          <p:cNvPr id="2" name="Title 1"/>
+          <p:cNvSpPr>
+            <a:spLocks noGrp="1"/>
+          </p:cNvSpPr>
+          <p:nvPr>
+            <p:ph type="title"/>
+          </p:nvPr>
+        </p:nvSpPr>
+        <p:spPr/>
+        <p:txBody>
+          <a:bodyPr/>
+          <a:lstStyle/>
+          <a:p>
+            <a:r>
+              <a:rPr lang="lt-LT" dirty="0" smtClean="0"/>
+              <a:t>Roboto „griaučiai“</a:t>
+            </a:r>
+            <a:endParaRPr lang="en-US" dirty="0"/>
+          </a:p>
+        </p:txBody>
+      </p:sp>
+      <p:pic>
+        <p:nvPicPr>
+          <p:cNvPr id="3074" name="Picture 2" descr="http://i.imgur.com/fFn1T55.png"/>
+          <p:cNvPicPr>
+            <a:picLocks noGrp="1" noChangeAspect="1" noChangeArrowheads="1"/>
+          </p:cNvPicPr>
+          <p:nvPr>
+            <p:ph idx="1"/>
+          </p:nvPr>
+        </p:nvPicPr>
+        <p:blipFill>
+          <a:blip r:embed="rId2">
+            <a:extLst>
+              <a:ext uri="{28A0092B-C50C-407E-A947-70E740481C1C}">
+                <a14:useLocalDpi xmlns:a14="http://schemas.microsoft.com/office/drawing/2010/main" val="0"/>
+              </a:ext>
+            </a:extLst>
+          </a:blip>
+          <a:srcRect/>
+          <a:stretch>
+            <a:fillRect/>
+          </a:stretch>
+        </p:blipFill>
+        <p:spPr bwMode="auto">
+          <a:xfrm>
+            <a:off x="838200" y="2116825"/>
+            <a:ext cx="10787743" cy="4652341"/>
+          </a:xfrm>
+          <a:prstGeom prst="rect">
+            <a:avLst/>
+          </a:prstGeom>
+          <a:noFill/>
+          <a:extLst>
+            <a:ext uri="{909E8E84-426E-40DD-AFC4-6F175D3DCCD1}">
+              <a14:hiddenFill xmlns:a14="http://schemas.microsoft.com/office/drawing/2010/main">
+                <a:solidFill>
+                  <a:srgbClr val="FFFFFF"/>
+                </a:solidFill>
+              </a14:hiddenFill>
+            </a:ext>
+          </a:extLst>
+        </p:spPr>
+      </p:pic>
+    </p:spTree>
+    <p:extLst>
+      <p:ext uri="{BB962C8B-B14F-4D97-AF65-F5344CB8AC3E}">
+        <p14:creationId xmlns:p14="http://schemas.microsoft.com/office/powerpoint/2010/main" val="4265708137"/>
+      </p:ext>
+    </p:extLst>
+  </p:cSld>
+  <p:clrMapOvr>
+    <a:masterClrMapping/>
+  </p:clrMapOvr>
+</p:sld>
+</file>
+
+<file path=ppt/slides/slide6.xml><?xml version="1.0" encoding="utf-8"?>
 <p:sld xmlns:a="http://schemas.openxmlformats.org/drawingml/2006/main" xmlns:r="http://schemas.openxmlformats.org/officeDocument/2006/relationships" xmlns:p="http://schemas.openxmlformats.org/presentationml/2006/main">
   <p:cSld>
     <p:spTree>
@@ -4350,105 +5563,7 @@
 </p:sld>
 </file>
 
-<file path=ppt/slides/slide20.xml><?xml version="1.0" encoding="utf-8"?>
-<p:sld xmlns:a="http://schemas.openxmlformats.org/drawingml/2006/main" xmlns:r="http://schemas.openxmlformats.org/officeDocument/2006/relationships" xmlns:p="http://schemas.openxmlformats.org/presentationml/2006/main">
-  <p:cSld>
-    <p:spTree>
-      <p:nvGrpSpPr>
-        <p:cNvPr id="1" name=""/>
-        <p:cNvGrpSpPr/>
-        <p:nvPr/>
-      </p:nvGrpSpPr>
-      <p:grpSpPr>
-        <a:xfrm>
-          <a:off x="0" y="0"/>
-          <a:ext cx="0" cy="0"/>
-          <a:chOff x="0" y="0"/>
-          <a:chExt cx="0" cy="0"/>
-        </a:xfrm>
-      </p:grpSpPr>
-      <p:sp>
-        <p:nvSpPr>
-          <p:cNvPr id="2" name="Title 1"/>
-          <p:cNvSpPr>
-            <a:spLocks noGrp="1"/>
-          </p:cNvSpPr>
-          <p:nvPr>
-            <p:ph type="title"/>
-          </p:nvPr>
-        </p:nvSpPr>
-        <p:spPr/>
-        <p:txBody>
-          <a:bodyPr>
-            <a:normAutofit fontScale="90000"/>
-          </a:bodyPr>
-          <a:lstStyle/>
-          <a:p>
-            <a:r>
-              <a:rPr lang="en-US" dirty="0" smtClean="0"/>
-              <a:t>https://channel9.msdn.com/Series/C-Sharp-Fundamentals-Development-for-Absolute-Beginners</a:t>
-            </a:r>
-            <a:endParaRPr lang="en-US" dirty="0"/>
-          </a:p>
-        </p:txBody>
-      </p:sp>
-      <p:pic>
-        <p:nvPicPr>
-          <p:cNvPr id="17412" name="Picture 4" descr="http://i.imgur.com/5d6njdH.png"/>
-          <p:cNvPicPr>
-            <a:picLocks noGrp="1" noChangeAspect="1" noChangeArrowheads="1"/>
-          </p:cNvPicPr>
-          <p:nvPr>
-            <p:ph idx="1"/>
-          </p:nvPr>
-        </p:nvPicPr>
-        <p:blipFill>
-          <a:blip r:embed="rId2">
-            <a:extLst>
-              <a:ext uri="{28A0092B-C50C-407E-A947-70E740481C1C}">
-                <a14:useLocalDpi xmlns:a14="http://schemas.microsoft.com/office/drawing/2010/main" val="0"/>
-              </a:ext>
-            </a:extLst>
-          </a:blip>
-          <a:srcRect/>
-          <a:stretch>
-            <a:fillRect/>
-          </a:stretch>
-        </p:blipFill>
-        <p:spPr bwMode="auto">
-          <a:xfrm>
-            <a:off x="1550534" y="2043113"/>
-            <a:ext cx="9090932" cy="4351337"/>
-          </a:xfrm>
-          <a:prstGeom prst="rect">
-            <a:avLst/>
-          </a:prstGeom>
-          <a:noFill/>
-          <a:extLst>
-            <a:ext uri="{909E8E84-426E-40DD-AFC4-6F175D3DCCD1}">
-              <a14:hiddenFill xmlns:a14="http://schemas.microsoft.com/office/drawing/2010/main">
-                <a:solidFill>
-                  <a:srgbClr val="FFFFFF"/>
-                </a:solidFill>
-              </a14:hiddenFill>
-            </a:ext>
-          </a:extLst>
-        </p:spPr>
-      </p:pic>
-    </p:spTree>
-    <p:extLst>
-      <p:ext uri="{BB962C8B-B14F-4D97-AF65-F5344CB8AC3E}">
-        <p14:creationId xmlns:p14="http://schemas.microsoft.com/office/powerpoint/2010/main" val="2782305416"/>
-      </p:ext>
-    </p:extLst>
-  </p:cSld>
-  <p:clrMapOvr>
-    <a:masterClrMapping/>
-  </p:clrMapOvr>
-</p:sld>
-</file>
-
-<file path=ppt/slides/slide3.xml><?xml version="1.0" encoding="utf-8"?>
+<file path=ppt/slides/slide7.xml><?xml version="1.0" encoding="utf-8"?>
 <p:sld xmlns:a="http://schemas.openxmlformats.org/drawingml/2006/main" xmlns:r="http://schemas.openxmlformats.org/officeDocument/2006/relationships" xmlns:p="http://schemas.openxmlformats.org/presentationml/2006/main">
   <p:cSld>
     <p:spTree>
@@ -4614,7 +5729,7 @@
 </p:sld>
 </file>
 
-<file path=ppt/slides/slide4.xml><?xml version="1.0" encoding="utf-8"?>
+<file path=ppt/slides/slide8.xml><?xml version="1.0" encoding="utf-8"?>
 <p:sld xmlns:a="http://schemas.openxmlformats.org/drawingml/2006/main" xmlns:r="http://schemas.openxmlformats.org/officeDocument/2006/relationships" xmlns:p="http://schemas.openxmlformats.org/presentationml/2006/main">
   <p:cSld>
     <p:spTree>
@@ -4715,7 +5830,7 @@
 </p:sld>
 </file>
 
-<file path=ppt/slides/slide5.xml><?xml version="1.0" encoding="utf-8"?>
+<file path=ppt/slides/slide9.xml><?xml version="1.0" encoding="utf-8"?>
 <p:sld xmlns:a="http://schemas.openxmlformats.org/drawingml/2006/main" xmlns:r="http://schemas.openxmlformats.org/officeDocument/2006/relationships" xmlns:p="http://schemas.openxmlformats.org/presentationml/2006/main">
   <p:cSld>
     <p:spTree>
@@ -4857,535 +5972,6 @@
     <p:extLst>
       <p:ext uri="{BB962C8B-B14F-4D97-AF65-F5344CB8AC3E}">
         <p14:creationId xmlns:p14="http://schemas.microsoft.com/office/powerpoint/2010/main" val="3138452432"/>
-      </p:ext>
-    </p:extLst>
-  </p:cSld>
-  <p:clrMapOvr>
-    <a:masterClrMapping/>
-  </p:clrMapOvr>
-</p:sld>
-</file>
-
-<file path=ppt/slides/slide6.xml><?xml version="1.0" encoding="utf-8"?>
-<p:sld xmlns:a="http://schemas.openxmlformats.org/drawingml/2006/main" xmlns:r="http://schemas.openxmlformats.org/officeDocument/2006/relationships" xmlns:p="http://schemas.openxmlformats.org/presentationml/2006/main">
-  <p:cSld>
-    <p:spTree>
-      <p:nvGrpSpPr>
-        <p:cNvPr id="1" name=""/>
-        <p:cNvGrpSpPr/>
-        <p:nvPr/>
-      </p:nvGrpSpPr>
-      <p:grpSpPr>
-        <a:xfrm>
-          <a:off x="0" y="0"/>
-          <a:ext cx="0" cy="0"/>
-          <a:chOff x="0" y="0"/>
-          <a:chExt cx="0" cy="0"/>
-        </a:xfrm>
-      </p:grpSpPr>
-      <p:sp>
-        <p:nvSpPr>
-          <p:cNvPr id="2" name="Title 1"/>
-          <p:cNvSpPr>
-            <a:spLocks noGrp="1"/>
-          </p:cNvSpPr>
-          <p:nvPr>
-            <p:ph type="title"/>
-          </p:nvPr>
-        </p:nvSpPr>
-        <p:spPr/>
-        <p:txBody>
-          <a:bodyPr/>
-          <a:lstStyle/>
-          <a:p>
-            <a:r>
-              <a:rPr lang="lt-LT" dirty="0" smtClean="0"/>
-              <a:t>List&lt;kažkos&gt; kintamojo tipas</a:t>
-            </a:r>
-            <a:endParaRPr lang="en-US" dirty="0"/>
-          </a:p>
-        </p:txBody>
-      </p:sp>
-      <p:pic>
-        <p:nvPicPr>
-          <p:cNvPr id="5126" name="Picture 6" descr="http://i.imgur.com/hnKb7A1.png"/>
-          <p:cNvPicPr>
-            <a:picLocks noChangeAspect="1" noChangeArrowheads="1"/>
-          </p:cNvPicPr>
-          <p:nvPr/>
-        </p:nvPicPr>
-        <p:blipFill>
-          <a:blip r:embed="rId2">
-            <a:extLst>
-              <a:ext uri="{28A0092B-C50C-407E-A947-70E740481C1C}">
-                <a14:useLocalDpi xmlns:a14="http://schemas.microsoft.com/office/drawing/2010/main" val="0"/>
-              </a:ext>
-            </a:extLst>
-          </a:blip>
-          <a:srcRect/>
-          <a:stretch>
-            <a:fillRect/>
-          </a:stretch>
-        </p:blipFill>
-        <p:spPr bwMode="auto">
-          <a:xfrm>
-            <a:off x="921929" y="1690688"/>
-            <a:ext cx="9737362" cy="4555890"/>
-          </a:xfrm>
-          <a:prstGeom prst="rect">
-            <a:avLst/>
-          </a:prstGeom>
-          <a:noFill/>
-          <a:extLst>
-            <a:ext uri="{909E8E84-426E-40DD-AFC4-6F175D3DCCD1}">
-              <a14:hiddenFill xmlns:a14="http://schemas.microsoft.com/office/drawing/2010/main">
-                <a:solidFill>
-                  <a:srgbClr val="FFFFFF"/>
-                </a:solidFill>
-              </a14:hiddenFill>
-            </a:ext>
-          </a:extLst>
-        </p:spPr>
-      </p:pic>
-    </p:spTree>
-    <p:extLst>
-      <p:ext uri="{BB962C8B-B14F-4D97-AF65-F5344CB8AC3E}">
-        <p14:creationId xmlns:p14="http://schemas.microsoft.com/office/powerpoint/2010/main" val="4146917460"/>
-      </p:ext>
-    </p:extLst>
-  </p:cSld>
-  <p:clrMapOvr>
-    <a:masterClrMapping/>
-  </p:clrMapOvr>
-</p:sld>
-</file>
-
-<file path=ppt/slides/slide7.xml><?xml version="1.0" encoding="utf-8"?>
-<p:sld xmlns:a="http://schemas.openxmlformats.org/drawingml/2006/main" xmlns:r="http://schemas.openxmlformats.org/officeDocument/2006/relationships" xmlns:p="http://schemas.openxmlformats.org/presentationml/2006/main">
-  <p:cSld>
-    <p:spTree>
-      <p:nvGrpSpPr>
-        <p:cNvPr id="1" name=""/>
-        <p:cNvGrpSpPr/>
-        <p:nvPr/>
-      </p:nvGrpSpPr>
-      <p:grpSpPr>
-        <a:xfrm>
-          <a:off x="0" y="0"/>
-          <a:ext cx="0" cy="0"/>
-          <a:chOff x="0" y="0"/>
-          <a:chExt cx="0" cy="0"/>
-        </a:xfrm>
-      </p:grpSpPr>
-      <p:sp>
-        <p:nvSpPr>
-          <p:cNvPr id="2" name="Title 1"/>
-          <p:cNvSpPr>
-            <a:spLocks noGrp="1"/>
-          </p:cNvSpPr>
-          <p:nvPr>
-            <p:ph type="title"/>
-          </p:nvPr>
-        </p:nvSpPr>
-        <p:spPr/>
-        <p:txBody>
-          <a:bodyPr/>
-          <a:lstStyle/>
-          <a:p>
-            <a:r>
-              <a:rPr lang="en-US" dirty="0" err="1" smtClean="0"/>
-              <a:t>Kaip</a:t>
-            </a:r>
-            <a:r>
-              <a:rPr lang="en-US" dirty="0" smtClean="0"/>
-              <a:t> </a:t>
-            </a:r>
-            <a:r>
-              <a:rPr lang="en-US" dirty="0" err="1" smtClean="0"/>
-              <a:t>patikrinti</a:t>
-            </a:r>
-            <a:r>
-              <a:rPr lang="en-US" dirty="0" smtClean="0"/>
-              <a:t>, </a:t>
-            </a:r>
-            <a:r>
-              <a:rPr lang="en-US" dirty="0" err="1" smtClean="0"/>
-              <a:t>ar</a:t>
-            </a:r>
-            <a:r>
-              <a:rPr lang="en-US" dirty="0" smtClean="0"/>
-              <a:t> </a:t>
-            </a:r>
-            <a:r>
-              <a:rPr lang="en-US" dirty="0" err="1" smtClean="0"/>
-              <a:t>List’as</a:t>
-            </a:r>
-            <a:r>
-              <a:rPr lang="en-US" dirty="0" smtClean="0"/>
-              <a:t> </a:t>
-            </a:r>
-            <a:r>
-              <a:rPr lang="en-US" dirty="0" err="1" smtClean="0"/>
-              <a:t>turi</a:t>
-            </a:r>
-            <a:r>
-              <a:rPr lang="lt-LT" dirty="0"/>
-              <a:t> </a:t>
-            </a:r>
-            <a:r>
-              <a:rPr lang="lt-LT" dirty="0" smtClean="0"/>
-              <a:t>mano </a:t>
-            </a:r>
-            <a:r>
-              <a:rPr lang="en-US" dirty="0" smtClean="0"/>
-              <a:t>element</a:t>
-            </a:r>
-            <a:r>
-              <a:rPr lang="lt-LT" dirty="0" smtClean="0"/>
-              <a:t>ą?</a:t>
-            </a:r>
-            <a:endParaRPr lang="en-US" dirty="0"/>
-          </a:p>
-        </p:txBody>
-      </p:sp>
-      <p:pic>
-        <p:nvPicPr>
-          <p:cNvPr id="8194" name="Picture 2" descr="http://i.imgur.com/HJTaw1z.png"/>
-          <p:cNvPicPr>
-            <a:picLocks noChangeAspect="1" noChangeArrowheads="1"/>
-          </p:cNvPicPr>
-          <p:nvPr/>
-        </p:nvPicPr>
-        <p:blipFill>
-          <a:blip r:embed="rId2">
-            <a:extLst>
-              <a:ext uri="{28A0092B-C50C-407E-A947-70E740481C1C}">
-                <a14:useLocalDpi xmlns:a14="http://schemas.microsoft.com/office/drawing/2010/main" val="0"/>
-              </a:ext>
-            </a:extLst>
-          </a:blip>
-          <a:srcRect/>
-          <a:stretch>
-            <a:fillRect/>
-          </a:stretch>
-        </p:blipFill>
-        <p:spPr bwMode="auto">
-          <a:xfrm>
-            <a:off x="838200" y="2340427"/>
-            <a:ext cx="9620250" cy="3657600"/>
-          </a:xfrm>
-          <a:prstGeom prst="rect">
-            <a:avLst/>
-          </a:prstGeom>
-          <a:noFill/>
-          <a:extLst>
-            <a:ext uri="{909E8E84-426E-40DD-AFC4-6F175D3DCCD1}">
-              <a14:hiddenFill xmlns:a14="http://schemas.microsoft.com/office/drawing/2010/main">
-                <a:solidFill>
-                  <a:srgbClr val="FFFFFF"/>
-                </a:solidFill>
-              </a14:hiddenFill>
-            </a:ext>
-          </a:extLst>
-        </p:spPr>
-      </p:pic>
-      <p:sp>
-        <p:nvSpPr>
-          <p:cNvPr id="4" name="TextBox 3"/>
-          <p:cNvSpPr txBox="1"/>
-          <p:nvPr/>
-        </p:nvSpPr>
-        <p:spPr>
-          <a:xfrm>
-            <a:off x="957943" y="1461559"/>
-            <a:ext cx="8064137" cy="369332"/>
-          </a:xfrm>
-          <a:prstGeom prst="rect">
-            <a:avLst/>
-          </a:prstGeom>
-          <a:noFill/>
-        </p:spPr>
-        <p:txBody>
-          <a:bodyPr wrap="square" rtlCol="0">
-            <a:spAutoFit/>
-          </a:bodyPr>
-          <a:lstStyle/>
-          <a:p>
-            <a:r>
-              <a:rPr lang="lt-LT" dirty="0" smtClean="0"/>
-              <a:t>Daugiau: https://www.dotnetperls.com/list</a:t>
-            </a:r>
-            <a:endParaRPr lang="en-US" dirty="0"/>
-          </a:p>
-        </p:txBody>
-      </p:sp>
-    </p:spTree>
-    <p:extLst>
-      <p:ext uri="{BB962C8B-B14F-4D97-AF65-F5344CB8AC3E}">
-        <p14:creationId xmlns:p14="http://schemas.microsoft.com/office/powerpoint/2010/main" val="2208338670"/>
-      </p:ext>
-    </p:extLst>
-  </p:cSld>
-  <p:clrMapOvr>
-    <a:masterClrMapping/>
-  </p:clrMapOvr>
-</p:sld>
-</file>
-
-<file path=ppt/slides/slide8.xml><?xml version="1.0" encoding="utf-8"?>
-<p:sld xmlns:a="http://schemas.openxmlformats.org/drawingml/2006/main" xmlns:r="http://schemas.openxmlformats.org/officeDocument/2006/relationships" xmlns:p="http://schemas.openxmlformats.org/presentationml/2006/main">
-  <p:cSld>
-    <p:spTree>
-      <p:nvGrpSpPr>
-        <p:cNvPr id="1" name=""/>
-        <p:cNvGrpSpPr/>
-        <p:nvPr/>
-      </p:nvGrpSpPr>
-      <p:grpSpPr>
-        <a:xfrm>
-          <a:off x="0" y="0"/>
-          <a:ext cx="0" cy="0"/>
-          <a:chOff x="0" y="0"/>
-          <a:chExt cx="0" cy="0"/>
-        </a:xfrm>
-      </p:grpSpPr>
-      <p:sp>
-        <p:nvSpPr>
-          <p:cNvPr id="2" name="Title 1"/>
-          <p:cNvSpPr>
-            <a:spLocks noGrp="1"/>
-          </p:cNvSpPr>
-          <p:nvPr>
-            <p:ph type="title"/>
-          </p:nvPr>
-        </p:nvSpPr>
-        <p:spPr/>
-        <p:txBody>
-          <a:bodyPr/>
-          <a:lstStyle/>
-          <a:p>
-            <a:r>
-              <a:rPr lang="lt-LT" dirty="0" smtClean="0"/>
-              <a:t>Kaip kaupti priešo judesius?</a:t>
-            </a:r>
-            <a:endParaRPr lang="en-US" dirty="0"/>
-          </a:p>
-        </p:txBody>
-      </p:sp>
-      <p:pic>
-        <p:nvPicPr>
-          <p:cNvPr id="7170" name="Picture 2" descr="http://i.imgur.com/xM05DPV.png"/>
-          <p:cNvPicPr>
-            <a:picLocks noChangeAspect="1" noChangeArrowheads="1"/>
-          </p:cNvPicPr>
-          <p:nvPr/>
-        </p:nvPicPr>
-        <p:blipFill>
-          <a:blip r:embed="rId2">
-            <a:extLst>
-              <a:ext uri="{28A0092B-C50C-407E-A947-70E740481C1C}">
-                <a14:useLocalDpi xmlns:a14="http://schemas.microsoft.com/office/drawing/2010/main" val="0"/>
-              </a:ext>
-            </a:extLst>
-          </a:blip>
-          <a:srcRect/>
-          <a:stretch>
-            <a:fillRect/>
-          </a:stretch>
-        </p:blipFill>
-        <p:spPr bwMode="auto">
-          <a:xfrm>
-            <a:off x="536120" y="1690688"/>
-            <a:ext cx="10913163" cy="2567803"/>
-          </a:xfrm>
-          <a:prstGeom prst="rect">
-            <a:avLst/>
-          </a:prstGeom>
-          <a:noFill/>
-          <a:extLst>
-            <a:ext uri="{909E8E84-426E-40DD-AFC4-6F175D3DCCD1}">
-              <a14:hiddenFill xmlns:a14="http://schemas.microsoft.com/office/drawing/2010/main">
-                <a:solidFill>
-                  <a:srgbClr val="FFFFFF"/>
-                </a:solidFill>
-              </a14:hiddenFill>
-            </a:ext>
-          </a:extLst>
-        </p:spPr>
-      </p:pic>
-      <p:sp>
-        <p:nvSpPr>
-          <p:cNvPr id="5" name="TextBox 4"/>
-          <p:cNvSpPr txBox="1"/>
-          <p:nvPr/>
-        </p:nvSpPr>
-        <p:spPr>
-          <a:xfrm>
-            <a:off x="627017" y="4667794"/>
-            <a:ext cx="10955383" cy="646331"/>
-          </a:xfrm>
-          <a:prstGeom prst="rect">
-            <a:avLst/>
-          </a:prstGeom>
-          <a:noFill/>
-        </p:spPr>
-        <p:txBody>
-          <a:bodyPr wrap="square" rtlCol="0">
-            <a:spAutoFit/>
-          </a:bodyPr>
-          <a:lstStyle/>
-          <a:p>
-            <a:r>
-              <a:rPr lang="lt-LT" sz="3600" dirty="0" smtClean="0"/>
-              <a:t>Ar veiks </a:t>
-            </a:r>
-            <a:r>
-              <a:rPr lang="lt-LT" sz="3600" dirty="0" smtClean="0">
-                <a:sym typeface="Wingdings" panose="05000000000000000000" pitchFamily="2" charset="2"/>
-              </a:rPr>
-              <a:t> ? </a:t>
-            </a:r>
-            <a:endParaRPr lang="en-US" sz="3600" dirty="0"/>
-          </a:p>
-        </p:txBody>
-      </p:sp>
-    </p:spTree>
-    <p:extLst>
-      <p:ext uri="{BB962C8B-B14F-4D97-AF65-F5344CB8AC3E}">
-        <p14:creationId xmlns:p14="http://schemas.microsoft.com/office/powerpoint/2010/main" val="914770925"/>
-      </p:ext>
-    </p:extLst>
-  </p:cSld>
-  <p:clrMapOvr>
-    <a:masterClrMapping/>
-  </p:clrMapOvr>
-</p:sld>
-</file>
-
-<file path=ppt/slides/slide9.xml><?xml version="1.0" encoding="utf-8"?>
-<p:sld xmlns:a="http://schemas.openxmlformats.org/drawingml/2006/main" xmlns:r="http://schemas.openxmlformats.org/officeDocument/2006/relationships" xmlns:p="http://schemas.openxmlformats.org/presentationml/2006/main">
-  <p:cSld>
-    <p:spTree>
-      <p:nvGrpSpPr>
-        <p:cNvPr id="1" name=""/>
-        <p:cNvGrpSpPr/>
-        <p:nvPr/>
-      </p:nvGrpSpPr>
-      <p:grpSpPr>
-        <a:xfrm>
-          <a:off x="0" y="0"/>
-          <a:ext cx="0" cy="0"/>
-          <a:chOff x="0" y="0"/>
-          <a:chExt cx="0" cy="0"/>
-        </a:xfrm>
-      </p:grpSpPr>
-      <p:sp>
-        <p:nvSpPr>
-          <p:cNvPr id="7" name="Title 6"/>
-          <p:cNvSpPr>
-            <a:spLocks noGrp="1"/>
-          </p:cNvSpPr>
-          <p:nvPr>
-            <p:ph type="title"/>
-          </p:nvPr>
-        </p:nvSpPr>
-        <p:spPr>
-          <a:xfrm>
-            <a:off x="838200" y="365125"/>
-            <a:ext cx="10515600" cy="3013801"/>
-          </a:xfrm>
-        </p:spPr>
-        <p:txBody>
-          <a:bodyPr/>
-          <a:lstStyle/>
-          <a:p>
-            <a:r>
-              <a:rPr lang="en-US" dirty="0" err="1" smtClean="0"/>
-              <a:t>Pataisytas</a:t>
-            </a:r>
-            <a:r>
-              <a:rPr lang="en-US" dirty="0" smtClean="0"/>
-              <a:t> </a:t>
-            </a:r>
-            <a:r>
-              <a:rPr lang="en-US" dirty="0" err="1" smtClean="0"/>
-              <a:t>pavyzdys</a:t>
-            </a:r>
-            <a:r>
-              <a:rPr lang="en-US" dirty="0" smtClean="0"/>
-              <a:t> – </a:t>
-            </a:r>
-            <a:r>
-              <a:rPr lang="en-US" dirty="0" err="1" smtClean="0"/>
-              <a:t>opponentsMoves</a:t>
-            </a:r>
-            <a:r>
-              <a:rPr lang="en-US" dirty="0" smtClean="0"/>
-              <a:t> </a:t>
-            </a:r>
-            <a:r>
-              <a:rPr lang="en-US" dirty="0" err="1" smtClean="0"/>
-              <a:t>negali</a:t>
-            </a:r>
-            <a:r>
-              <a:rPr lang="en-US" dirty="0" smtClean="0"/>
-              <a:t> b</a:t>
-            </a:r>
-            <a:r>
-              <a:rPr lang="lt-LT" dirty="0" smtClean="0"/>
-              <a:t>ūti metodo viduje, nes kas kartą kviečiant metodą būtų sukuriamas iš naujo.</a:t>
-            </a:r>
-            <a:endParaRPr lang="en-US" dirty="0"/>
-          </a:p>
-        </p:txBody>
-      </p:sp>
-      <p:pic>
-        <p:nvPicPr>
-          <p:cNvPr id="6148" name="Picture 4" descr="http://i.imgur.com/RyQ0W2r.png"/>
-          <p:cNvPicPr>
-            <a:picLocks noGrp="1" noChangeAspect="1" noChangeArrowheads="1"/>
-          </p:cNvPicPr>
-          <p:nvPr>
-            <p:ph idx="1"/>
-          </p:nvPr>
-        </p:nvPicPr>
-        <p:blipFill>
-          <a:blip r:embed="rId2">
-            <a:extLst>
-              <a:ext uri="{28A0092B-C50C-407E-A947-70E740481C1C}">
-                <a14:useLocalDpi xmlns:a14="http://schemas.microsoft.com/office/drawing/2010/main" val="0"/>
-              </a:ext>
-            </a:extLst>
-          </a:blip>
-          <a:srcRect/>
-          <a:stretch>
-            <a:fillRect/>
-          </a:stretch>
-        </p:blipFill>
-        <p:spPr bwMode="auto">
-          <a:xfrm>
-            <a:off x="838200" y="3378926"/>
-            <a:ext cx="14210028" cy="2917370"/>
-          </a:xfrm>
-          <a:prstGeom prst="rect">
-            <a:avLst/>
-          </a:prstGeom>
-          <a:noFill/>
-          <a:extLst>
-            <a:ext uri="{909E8E84-426E-40DD-AFC4-6F175D3DCCD1}">
-              <a14:hiddenFill xmlns:a14="http://schemas.microsoft.com/office/drawing/2010/main">
-                <a:solidFill>
-                  <a:srgbClr val="FFFFFF"/>
-                </a:solidFill>
-              </a14:hiddenFill>
-            </a:ext>
-          </a:extLst>
-        </p:spPr>
-      </p:pic>
-    </p:spTree>
-    <p:extLst>
-      <p:ext uri="{BB962C8B-B14F-4D97-AF65-F5344CB8AC3E}">
-        <p14:creationId xmlns:p14="http://schemas.microsoft.com/office/powerpoint/2010/main" val="1411561169"/>
       </p:ext>
     </p:extLst>
   </p:cSld>

</xml_diff>